<commit_message>
atualizando seção de SOLID
</commit_message>
<xml_diff>
--- a/Sistema Drugs and Drage ons v_09_11.pptx
+++ b/Sistema Drugs and Drage ons v_09_11.pptx
@@ -6826,7 +6826,9 @@
         </p:nvSpPr>
         <p:spPr/>
         <p:txBody>
-          <a:bodyPr/>
+          <a:bodyPr>
+            <a:normAutofit fontScale="92500" lnSpcReduction="10000"/>
+          </a:bodyPr>
           <a:lstStyle/>
           <a:p>
             <a:r>
@@ -6881,6 +6883,18 @@
             <a:r>
               <a:rPr lang="pt-BR" dirty="0"/>
               <a:t>Um exemplo é a separação de classes entre pedido e carrinho por considerar que são fases distintas do processo de compra e que têm requisitos específicos</a:t>
+            </a:r>
+          </a:p>
+          <a:p>
+            <a:pPr marL="114300" indent="0">
+              <a:buNone/>
+            </a:pPr>
+            <a:endParaRPr lang="pt-BR" dirty="0"/>
+          </a:p>
+          <a:p>
+            <a:r>
+              <a:rPr lang="pt-BR" dirty="0"/>
+              <a:t>Outro exemplo trata-se das classes Cliente e Endereço, onde entendemos que os dados de localização do cliente deveriam estar em uma classe com o único objetivo de lidar com informações sobre localização. Nesse caso, atribuímos essa responsabilidade para a classe Endereço.</a:t>
             </a:r>
           </a:p>
         </p:txBody>

</xml_diff>

<commit_message>
Alteração do diagrama de classe e inclusão do SOLID
</commit_message>
<xml_diff>
--- a/Sistema Drugs and Drage ons v_09_11.pptx
+++ b/Sistema Drugs and Drage ons v_09_11.pptx
@@ -7027,7 +7027,7 @@
             </a:r>
             <a:r>
               <a:rPr lang="en-US" dirty="0" err="1"/>
-              <a:t>migraçÕes</a:t>
+              <a:t>migrações</a:t>
             </a:r>
             <a:r>
               <a:rPr lang="en-US" dirty="0"/>
@@ -7123,7 +7123,42 @@
           <a:bodyPr/>
           <a:lstStyle/>
           <a:p>
-            <a:endParaRPr lang="pt-BR"/>
+            <a:r>
+              <a:rPr lang="pt-BR" dirty="0"/>
+              <a:t>Em nosso trabalho, o LSP foi seguido e isso pode ser observado nas classes “Usuário”, “Cliente” e “Funcionário”. Anteriormente, a classe Usuário possuía um atributo “</a:t>
+            </a:r>
+            <a:r>
+              <a:rPr lang="pt-BR" dirty="0" err="1"/>
+              <a:t>IDcliente</a:t>
+            </a:r>
+            <a:r>
+              <a:rPr lang="pt-BR" dirty="0"/>
+              <a:t>” e "</a:t>
+            </a:r>
+            <a:r>
+              <a:rPr lang="pt-BR" dirty="0" err="1"/>
+              <a:t>IDfuncionario</a:t>
+            </a:r>
+            <a:r>
+              <a:rPr lang="pt-BR" dirty="0"/>
+              <a:t>", o que feria o Princípio de </a:t>
+            </a:r>
+            <a:r>
+              <a:rPr lang="pt-BR" dirty="0" err="1"/>
+              <a:t>Liskov</a:t>
+            </a:r>
+            <a:r>
+              <a:rPr lang="pt-BR" dirty="0"/>
+              <a:t>, visto que não se podia substituir a classe “Usuário” por qualquer um de suas subclasses. Então, seguindo o princípio SOLID, ambos os atributos foram substituídos pelo atributo novo “</a:t>
+            </a:r>
+            <a:r>
+              <a:rPr lang="pt-BR" dirty="0" err="1"/>
+              <a:t>IDusuário</a:t>
+            </a:r>
+            <a:r>
+              <a:rPr lang="pt-BR" dirty="0"/>
+              <a:t>”.</a:t>
+            </a:r>
           </a:p>
         </p:txBody>
       </p:sp>
@@ -7173,7 +7208,12 @@
             <p:ph type="title"/>
           </p:nvPr>
         </p:nvSpPr>
-        <p:spPr/>
+        <p:spPr>
+          <a:xfrm>
+            <a:off x="311700" y="452459"/>
+            <a:ext cx="8520600" cy="707400"/>
+          </a:xfrm>
+        </p:spPr>
         <p:txBody>
           <a:bodyPr>
             <a:normAutofit fontScale="90000"/>
@@ -7209,7 +7249,26 @@
           <a:bodyPr/>
           <a:lstStyle/>
           <a:p>
-            <a:endParaRPr lang="pt-BR"/>
+            <a:r>
+              <a:rPr lang="pt-BR" dirty="0"/>
+              <a:t>Para o princípio da </a:t>
+            </a:r>
+            <a:r>
+              <a:rPr lang="pt-BR" dirty="0" err="1"/>
+              <a:t>segração</a:t>
+            </a:r>
+            <a:r>
+              <a:rPr lang="pt-BR" dirty="0"/>
+              <a:t> da interface, poderia ter sido utilizado uma interface de pagamento que permitisse a comunicação com qualquer sistema de validação de compras, sem prejuízo da completude das transações. Assim, foi criada uma interface de pagamento para realizar esta comunicação. De acordo com o padrão </a:t>
+            </a:r>
+            <a:r>
+              <a:rPr lang="pt-BR" dirty="0" err="1"/>
+              <a:t>Adapter</a:t>
+            </a:r>
+            <a:r>
+              <a:rPr lang="pt-BR" dirty="0"/>
+              <a:t>.</a:t>
+            </a:r>
           </a:p>
         </p:txBody>
       </p:sp>

</xml_diff>